<commit_message>
update to chapter 27
</commit_message>
<xml_diff>
--- a/MySQL实战/25MySQL是怎么保证高可用的？.pptx
+++ b/MySQL实战/25MySQL是怎么保证高可用的？.pptx
@@ -203,7 +203,7 @@
           <a:p>
             <a:fld id="{A900F2CD-AD8F-46FC-AAAB-A0D218D6826F}" type="datetimeFigureOut">
               <a:rPr lang="zh-CN" altLang="en-US" smtClean="0"/>
-              <a:t>2019/5/28</a:t>
+              <a:t>2019/5/29</a:t>
             </a:fld>
             <a:endParaRPr lang="zh-CN" altLang="en-US"/>
           </a:p>
@@ -1161,7 +1161,7 @@
           <a:p>
             <a:fld id="{E396512D-F96B-4538-B91A-F7EB57A489A0}" type="datetimeFigureOut">
               <a:rPr lang="zh-CN" altLang="en-US" smtClean="0"/>
-              <a:t>2019/5/28</a:t>
+              <a:t>2019/5/29</a:t>
             </a:fld>
             <a:endParaRPr lang="zh-CN" altLang="en-US"/>
           </a:p>
@@ -1436,7 +1436,7 @@
           <a:p>
             <a:fld id="{E396512D-F96B-4538-B91A-F7EB57A489A0}" type="datetimeFigureOut">
               <a:rPr lang="zh-CN" altLang="en-US" smtClean="0"/>
-              <a:t>2019/5/28</a:t>
+              <a:t>2019/5/29</a:t>
             </a:fld>
             <a:endParaRPr lang="zh-CN" altLang="en-US"/>
           </a:p>
@@ -1630,7 +1630,7 @@
           <a:p>
             <a:fld id="{E396512D-F96B-4538-B91A-F7EB57A489A0}" type="datetimeFigureOut">
               <a:rPr lang="zh-CN" altLang="en-US" smtClean="0"/>
-              <a:t>2019/5/28</a:t>
+              <a:t>2019/5/29</a:t>
             </a:fld>
             <a:endParaRPr lang="zh-CN" altLang="en-US"/>
           </a:p>
@@ -1903,7 +1903,7 @@
           <a:p>
             <a:fld id="{E396512D-F96B-4538-B91A-F7EB57A489A0}" type="datetimeFigureOut">
               <a:rPr lang="zh-CN" altLang="en-US" smtClean="0"/>
-              <a:t>2019/5/28</a:t>
+              <a:t>2019/5/29</a:t>
             </a:fld>
             <a:endParaRPr lang="zh-CN" altLang="en-US"/>
           </a:p>
@@ -2244,7 +2244,7 @@
           <a:p>
             <a:fld id="{E396512D-F96B-4538-B91A-F7EB57A489A0}" type="datetimeFigureOut">
               <a:rPr lang="zh-CN" altLang="en-US" smtClean="0"/>
-              <a:t>2019/5/28</a:t>
+              <a:t>2019/5/29</a:t>
             </a:fld>
             <a:endParaRPr lang="zh-CN" altLang="en-US"/>
           </a:p>
@@ -2867,7 +2867,7 @@
           <a:p>
             <a:fld id="{E396512D-F96B-4538-B91A-F7EB57A489A0}" type="datetimeFigureOut">
               <a:rPr lang="zh-CN" altLang="en-US" smtClean="0"/>
-              <a:t>2019/5/28</a:t>
+              <a:t>2019/5/29</a:t>
             </a:fld>
             <a:endParaRPr lang="zh-CN" altLang="en-US"/>
           </a:p>
@@ -3727,7 +3727,7 @@
           <a:p>
             <a:fld id="{E396512D-F96B-4538-B91A-F7EB57A489A0}" type="datetimeFigureOut">
               <a:rPr lang="zh-CN" altLang="en-US" smtClean="0"/>
-              <a:t>2019/5/28</a:t>
+              <a:t>2019/5/29</a:t>
             </a:fld>
             <a:endParaRPr lang="zh-CN" altLang="en-US"/>
           </a:p>
@@ -3897,7 +3897,7 @@
           <a:p>
             <a:fld id="{E396512D-F96B-4538-B91A-F7EB57A489A0}" type="datetimeFigureOut">
               <a:rPr lang="zh-CN" altLang="en-US" smtClean="0"/>
-              <a:t>2019/5/28</a:t>
+              <a:t>2019/5/29</a:t>
             </a:fld>
             <a:endParaRPr lang="zh-CN" altLang="en-US"/>
           </a:p>
@@ -4077,7 +4077,7 @@
           <a:p>
             <a:fld id="{E396512D-F96B-4538-B91A-F7EB57A489A0}" type="datetimeFigureOut">
               <a:rPr lang="zh-CN" altLang="en-US" smtClean="0"/>
-              <a:t>2019/5/28</a:t>
+              <a:t>2019/5/29</a:t>
             </a:fld>
             <a:endParaRPr lang="zh-CN" altLang="en-US"/>
           </a:p>
@@ -4247,7 +4247,7 @@
           <a:p>
             <a:fld id="{E396512D-F96B-4538-B91A-F7EB57A489A0}" type="datetimeFigureOut">
               <a:rPr lang="zh-CN" altLang="en-US" smtClean="0"/>
-              <a:t>2019/5/28</a:t>
+              <a:t>2019/5/29</a:t>
             </a:fld>
             <a:endParaRPr lang="zh-CN" altLang="en-US"/>
           </a:p>
@@ -4494,7 +4494,7 @@
           <a:p>
             <a:fld id="{E396512D-F96B-4538-B91A-F7EB57A489A0}" type="datetimeFigureOut">
               <a:rPr lang="zh-CN" altLang="en-US" smtClean="0"/>
-              <a:t>2019/5/28</a:t>
+              <a:t>2019/5/29</a:t>
             </a:fld>
             <a:endParaRPr lang="zh-CN" altLang="en-US"/>
           </a:p>
@@ -4786,7 +4786,7 @@
           <a:p>
             <a:fld id="{E396512D-F96B-4538-B91A-F7EB57A489A0}" type="datetimeFigureOut">
               <a:rPr lang="zh-CN" altLang="en-US" smtClean="0"/>
-              <a:t>2019/5/28</a:t>
+              <a:t>2019/5/29</a:t>
             </a:fld>
             <a:endParaRPr lang="zh-CN" altLang="en-US"/>
           </a:p>
@@ -5230,7 +5230,7 @@
           <a:p>
             <a:fld id="{E396512D-F96B-4538-B91A-F7EB57A489A0}" type="datetimeFigureOut">
               <a:rPr lang="zh-CN" altLang="en-US" smtClean="0"/>
-              <a:t>2019/5/28</a:t>
+              <a:t>2019/5/29</a:t>
             </a:fld>
             <a:endParaRPr lang="zh-CN" altLang="en-US"/>
           </a:p>
@@ -5348,7 +5348,7 @@
           <a:p>
             <a:fld id="{E396512D-F96B-4538-B91A-F7EB57A489A0}" type="datetimeFigureOut">
               <a:rPr lang="zh-CN" altLang="en-US" smtClean="0"/>
-              <a:t>2019/5/28</a:t>
+              <a:t>2019/5/29</a:t>
             </a:fld>
             <a:endParaRPr lang="zh-CN" altLang="en-US"/>
           </a:p>
@@ -5443,7 +5443,7 @@
           <a:p>
             <a:fld id="{E396512D-F96B-4538-B91A-F7EB57A489A0}" type="datetimeFigureOut">
               <a:rPr lang="zh-CN" altLang="en-US" smtClean="0"/>
-              <a:t>2019/5/28</a:t>
+              <a:t>2019/5/29</a:t>
             </a:fld>
             <a:endParaRPr lang="zh-CN" altLang="en-US"/>
           </a:p>
@@ -5722,7 +5722,7 @@
           <a:p>
             <a:fld id="{E396512D-F96B-4538-B91A-F7EB57A489A0}" type="datetimeFigureOut">
               <a:rPr lang="zh-CN" altLang="en-US" smtClean="0"/>
-              <a:t>2019/5/28</a:t>
+              <a:t>2019/5/29</a:t>
             </a:fld>
             <a:endParaRPr lang="zh-CN" altLang="en-US"/>
           </a:p>
@@ -5997,7 +5997,7 @@
           <a:p>
             <a:fld id="{E396512D-F96B-4538-B91A-F7EB57A489A0}" type="datetimeFigureOut">
               <a:rPr lang="zh-CN" altLang="en-US" smtClean="0"/>
-              <a:t>2019/5/28</a:t>
+              <a:t>2019/5/29</a:t>
             </a:fld>
             <a:endParaRPr lang="zh-CN" altLang="en-US"/>
           </a:p>
@@ -6426,7 +6426,7 @@
           <a:p>
             <a:fld id="{E396512D-F96B-4538-B91A-F7EB57A489A0}" type="datetimeFigureOut">
               <a:rPr lang="zh-CN" altLang="en-US" smtClean="0"/>
-              <a:t>2019/5/28</a:t>
+              <a:t>2019/5/29</a:t>
             </a:fld>
             <a:endParaRPr lang="zh-CN" altLang="en-US"/>
           </a:p>
@@ -8038,14 +8038,7 @@
                 <a:latin typeface="微软雅黑" panose="020B0503020204020204" pitchFamily="34" charset="-122"/>
                 <a:ea typeface="微软雅黑" panose="020B0503020204020204" pitchFamily="34" charset="-122"/>
               </a:rPr>
-              <a:t>来获取主库</a:t>
-            </a:r>
-            <a:r>
-              <a:rPr lang="zh-CN" altLang="en-US" sz="1200" dirty="0" smtClean="0">
-                <a:latin typeface="微软雅黑" panose="020B0503020204020204" pitchFamily="34" charset="-122"/>
-                <a:ea typeface="微软雅黑" panose="020B0503020204020204" pitchFamily="34" charset="-122"/>
-              </a:rPr>
-              <a:t>时间</a:t>
+              <a:t>来获取主库时间</a:t>
             </a:r>
             <a:endParaRPr lang="en-US" altLang="zh-CN" sz="1200" dirty="0" smtClean="0">
               <a:latin typeface="微软雅黑" panose="020B0503020204020204" pitchFamily="34" charset="-122"/>
@@ -9413,6 +9406,66 @@
             <a:endParaRPr lang="en-US" altLang="zh-CN" sz="1600" dirty="0" smtClean="0">
               <a:solidFill>
                 <a:srgbClr val="92D050"/>
+              </a:solidFill>
+              <a:latin typeface="微软雅黑" panose="020B0503020204020204" pitchFamily="34" charset="-122"/>
+              <a:ea typeface="微软雅黑" panose="020B0503020204020204" pitchFamily="34" charset="-122"/>
+            </a:endParaRPr>
+          </a:p>
+        </p:txBody>
+      </p:sp>
+      <p:sp>
+        <p:nvSpPr>
+          <p:cNvPr id="15" name="矩形 14"/>
+          <p:cNvSpPr/>
+          <p:nvPr/>
+        </p:nvSpPr>
+        <p:spPr>
+          <a:xfrm>
+            <a:off x="3416299" y="4269586"/>
+            <a:ext cx="3486615" cy="307777"/>
+          </a:xfrm>
+          <a:prstGeom prst="rect">
+            <a:avLst/>
+          </a:prstGeom>
+        </p:spPr>
+        <p:txBody>
+          <a:bodyPr wrap="square">
+            <a:spAutoFit/>
+          </a:bodyPr>
+          <a:lstStyle/>
+          <a:p>
+            <a:r>
+              <a:rPr lang="zh-CN" altLang="en-US" sz="1400" dirty="0" smtClean="0">
+                <a:solidFill>
+                  <a:schemeClr val="accent1">
+                    <a:lumMod val="40000"/>
+                    <a:lumOff val="60000"/>
+                  </a:schemeClr>
+                </a:solidFill>
+                <a:latin typeface="微软雅黑" panose="020B0503020204020204" pitchFamily="34" charset="-122"/>
+                <a:ea typeface="微软雅黑" panose="020B0503020204020204" pitchFamily="34" charset="-122"/>
+              </a:rPr>
+              <a:t>再次说明大事务的影响</a:t>
+            </a:r>
+            <a:r>
+              <a:rPr lang="zh-CN" altLang="en-US" sz="1400" dirty="0" smtClean="0">
+                <a:solidFill>
+                  <a:schemeClr val="accent1">
+                    <a:lumMod val="40000"/>
+                    <a:lumOff val="60000"/>
+                  </a:schemeClr>
+                </a:solidFill>
+                <a:latin typeface="微软雅黑" panose="020B0503020204020204" pitchFamily="34" charset="-122"/>
+                <a:ea typeface="微软雅黑" panose="020B0503020204020204" pitchFamily="34" charset="-122"/>
+              </a:rPr>
+              <a:t>！</a:t>
+            </a:r>
+            <a:endParaRPr lang="en-US" altLang="zh-CN" sz="1400" dirty="0" smtClean="0">
+              <a:solidFill>
+                <a:schemeClr val="accent1">
+                  <a:lumMod val="40000"/>
+                  <a:lumOff val="60000"/>
+                </a:schemeClr>
               </a:solidFill>
               <a:latin typeface="微软雅黑" panose="020B0503020204020204" pitchFamily="34" charset="-122"/>
               <a:ea typeface="微软雅黑" panose="020B0503020204020204" pitchFamily="34" charset="-122"/>

</xml_diff>